<commit_message>
added instructions to the w2w slides. Still need to add navigational buttons
</commit_message>
<xml_diff>
--- a/When 2 Work/Introduction to W2W.pptx
+++ b/When 2 Work/Introduction to W2W.pptx
@@ -261,7 +261,7 @@
           <a:p>
             <a:fld id="{B4B40502-F996-416A-ACA3-4D0859D5FF4C}" type="datetimeFigureOut">
               <a:rPr lang="en-US" smtClean="0"/>
-              <a:t>11/2/2016</a:t>
+              <a:t>11/2/16</a:t>
             </a:fld>
             <a:endParaRPr lang="en-US"/>
           </a:p>
@@ -431,7 +431,7 @@
           <a:p>
             <a:fld id="{B4B40502-F996-416A-ACA3-4D0859D5FF4C}" type="datetimeFigureOut">
               <a:rPr lang="en-US" smtClean="0"/>
-              <a:t>11/2/2016</a:t>
+              <a:t>11/2/16</a:t>
             </a:fld>
             <a:endParaRPr lang="en-US"/>
           </a:p>
@@ -611,7 +611,7 @@
           <a:p>
             <a:fld id="{B4B40502-F996-416A-ACA3-4D0859D5FF4C}" type="datetimeFigureOut">
               <a:rPr lang="en-US" smtClean="0"/>
-              <a:t>11/2/2016</a:t>
+              <a:t>11/2/16</a:t>
             </a:fld>
             <a:endParaRPr lang="en-US"/>
           </a:p>
@@ -781,7 +781,7 @@
           <a:p>
             <a:fld id="{B4B40502-F996-416A-ACA3-4D0859D5FF4C}" type="datetimeFigureOut">
               <a:rPr lang="en-US" smtClean="0"/>
-              <a:t>11/2/2016</a:t>
+              <a:t>11/2/16</a:t>
             </a:fld>
             <a:endParaRPr lang="en-US"/>
           </a:p>
@@ -1027,7 +1027,7 @@
           <a:p>
             <a:fld id="{B4B40502-F996-416A-ACA3-4D0859D5FF4C}" type="datetimeFigureOut">
               <a:rPr lang="en-US" smtClean="0"/>
-              <a:t>11/2/2016</a:t>
+              <a:t>11/2/16</a:t>
             </a:fld>
             <a:endParaRPr lang="en-US"/>
           </a:p>
@@ -1259,7 +1259,7 @@
           <a:p>
             <a:fld id="{B4B40502-F996-416A-ACA3-4D0859D5FF4C}" type="datetimeFigureOut">
               <a:rPr lang="en-US" smtClean="0"/>
-              <a:t>11/2/2016</a:t>
+              <a:t>11/2/16</a:t>
             </a:fld>
             <a:endParaRPr lang="en-US"/>
           </a:p>
@@ -1626,7 +1626,7 @@
           <a:p>
             <a:fld id="{B4B40502-F996-416A-ACA3-4D0859D5FF4C}" type="datetimeFigureOut">
               <a:rPr lang="en-US" smtClean="0"/>
-              <a:t>11/2/2016</a:t>
+              <a:t>11/2/16</a:t>
             </a:fld>
             <a:endParaRPr lang="en-US"/>
           </a:p>
@@ -1744,7 +1744,7 @@
           <a:p>
             <a:fld id="{B4B40502-F996-416A-ACA3-4D0859D5FF4C}" type="datetimeFigureOut">
               <a:rPr lang="en-US" smtClean="0"/>
-              <a:t>11/2/2016</a:t>
+              <a:t>11/2/16</a:t>
             </a:fld>
             <a:endParaRPr lang="en-US"/>
           </a:p>
@@ -1839,7 +1839,7 @@
           <a:p>
             <a:fld id="{B4B40502-F996-416A-ACA3-4D0859D5FF4C}" type="datetimeFigureOut">
               <a:rPr lang="en-US" smtClean="0"/>
-              <a:t>11/2/2016</a:t>
+              <a:t>11/2/16</a:t>
             </a:fld>
             <a:endParaRPr lang="en-US"/>
           </a:p>
@@ -2116,7 +2116,7 @@
           <a:p>
             <a:fld id="{B4B40502-F996-416A-ACA3-4D0859D5FF4C}" type="datetimeFigureOut">
               <a:rPr lang="en-US" smtClean="0"/>
-              <a:t>11/2/2016</a:t>
+              <a:t>11/2/16</a:t>
             </a:fld>
             <a:endParaRPr lang="en-US"/>
           </a:p>
@@ -2369,7 +2369,7 @@
           <a:p>
             <a:fld id="{B4B40502-F996-416A-ACA3-4D0859D5FF4C}" type="datetimeFigureOut">
               <a:rPr lang="en-US" smtClean="0"/>
-              <a:t>11/2/2016</a:t>
+              <a:t>11/2/16</a:t>
             </a:fld>
             <a:endParaRPr lang="en-US"/>
           </a:p>
@@ -2582,7 +2582,7 @@
           <a:p>
             <a:fld id="{B4B40502-F996-416A-ACA3-4D0859D5FF4C}" type="datetimeFigureOut">
               <a:rPr lang="en-US" smtClean="0"/>
-              <a:t>11/2/2016</a:t>
+              <a:t>11/2/16</a:t>
             </a:fld>
             <a:endParaRPr lang="en-US"/>
           </a:p>
@@ -3492,25 +3492,30 @@
                   <a:schemeClr val="bg1"/>
                 </a:solidFill>
               </a:rPr>
-              <a:t>Welcome to When2Work </a:t>
-            </a:r>
+              <a:t>This is Everyone’s Schedule</a:t>
+            </a:r>
+            <a:endParaRPr lang="en-US" dirty="0" smtClean="0">
+              <a:solidFill>
+                <a:schemeClr val="bg1"/>
+              </a:solidFill>
+            </a:endParaRPr>
+          </a:p>
+          <a:p>
             <a:r>
               <a:rPr lang="en-US" dirty="0" smtClean="0">
                 <a:solidFill>
                   <a:schemeClr val="bg1"/>
                 </a:solidFill>
               </a:rPr>
-              <a:t> </a:t>
-            </a:r>
-          </a:p>
-          <a:p>
+              <a:t>	</a:t>
+            </a:r>
             <a:r>
               <a:rPr lang="en-US" dirty="0" smtClean="0">
                 <a:solidFill>
                   <a:schemeClr val="bg1"/>
                 </a:solidFill>
               </a:rPr>
-              <a:t>	Your Employee Scheduling System</a:t>
+              <a:t>Here, you can see who is working for a full week.</a:t>
             </a:r>
             <a:endParaRPr lang="en-US" dirty="0">
               <a:solidFill>
@@ -3792,25 +3797,30 @@
                   <a:schemeClr val="bg1"/>
                 </a:solidFill>
               </a:rPr>
-              <a:t>Welcome to When2Work </a:t>
-            </a:r>
+              <a:t>Edit your information</a:t>
+            </a:r>
+            <a:endParaRPr lang="en-US" dirty="0" smtClean="0">
+              <a:solidFill>
+                <a:schemeClr val="bg1"/>
+              </a:solidFill>
+            </a:endParaRPr>
+          </a:p>
+          <a:p>
             <a:r>
               <a:rPr lang="en-US" dirty="0" smtClean="0">
                 <a:solidFill>
                   <a:schemeClr val="bg1"/>
                 </a:solidFill>
               </a:rPr>
-              <a:t> </a:t>
-            </a:r>
-          </a:p>
-          <a:p>
-            <a:r>
-              <a:rPr lang="en-US" dirty="0" smtClean="0">
+              <a:t>	</a:t>
+            </a:r>
+            <a:r>
+              <a:rPr lang="en-US" sz="1600" dirty="0" smtClean="0">
                 <a:solidFill>
                   <a:schemeClr val="bg1"/>
                 </a:solidFill>
               </a:rPr>
-              <a:t>	Your Employee Scheduling System</a:t>
+              <a:t>This page allows you to manage your contact information</a:t>
             </a:r>
             <a:endParaRPr lang="en-US" dirty="0">
               <a:solidFill>
@@ -4092,25 +4102,30 @@
                   <a:schemeClr val="bg1"/>
                 </a:solidFill>
               </a:rPr>
-              <a:t>Welcome to When2Work </a:t>
-            </a:r>
+              <a:t>Change your availability</a:t>
+            </a:r>
+            <a:endParaRPr lang="en-US" dirty="0" smtClean="0">
+              <a:solidFill>
+                <a:schemeClr val="bg1"/>
+              </a:solidFill>
+            </a:endParaRPr>
+          </a:p>
+          <a:p>
             <a:r>
               <a:rPr lang="en-US" dirty="0" smtClean="0">
                 <a:solidFill>
                   <a:schemeClr val="bg1"/>
                 </a:solidFill>
               </a:rPr>
-              <a:t> </a:t>
-            </a:r>
-          </a:p>
-          <a:p>
-            <a:r>
-              <a:rPr lang="en-US" dirty="0" smtClean="0">
+              <a:t>	</a:t>
+            </a:r>
+            <a:r>
+              <a:rPr lang="en-US" sz="1200" dirty="0" smtClean="0">
                 <a:solidFill>
                   <a:schemeClr val="bg1"/>
                 </a:solidFill>
               </a:rPr>
-              <a:t>	Your Employee Scheduling System</a:t>
+              <a:t>Adjusting your availability will let your manager know when you can work</a:t>
             </a:r>
             <a:endParaRPr lang="en-US" dirty="0">
               <a:solidFill>
@@ -4392,25 +4407,30 @@
                   <a:schemeClr val="bg1"/>
                 </a:solidFill>
               </a:rPr>
-              <a:t>Welcome to When2Work </a:t>
-            </a:r>
+              <a:t>Request Time Off</a:t>
+            </a:r>
+            <a:endParaRPr lang="en-US" dirty="0" smtClean="0">
+              <a:solidFill>
+                <a:schemeClr val="bg1"/>
+              </a:solidFill>
+            </a:endParaRPr>
+          </a:p>
+          <a:p>
             <a:r>
               <a:rPr lang="en-US" dirty="0" smtClean="0">
                 <a:solidFill>
                   <a:schemeClr val="bg1"/>
                 </a:solidFill>
               </a:rPr>
-              <a:t> </a:t>
-            </a:r>
-          </a:p>
-          <a:p>
-            <a:r>
-              <a:rPr lang="en-US" dirty="0" smtClean="0">
+              <a:t>	</a:t>
+            </a:r>
+            <a:r>
+              <a:rPr lang="en-US" sz="1400" dirty="0" smtClean="0">
                 <a:solidFill>
                   <a:schemeClr val="bg1"/>
                 </a:solidFill>
               </a:rPr>
-              <a:t>	Your Employee Scheduling System</a:t>
+              <a:t>Let your manager know you are going away to request time off.</a:t>
             </a:r>
             <a:endParaRPr lang="en-US" dirty="0">
               <a:solidFill>
@@ -4692,25 +4712,30 @@
                   <a:schemeClr val="bg1"/>
                 </a:solidFill>
               </a:rPr>
-              <a:t>Welcome to When2Work </a:t>
-            </a:r>
+              <a:t>View available shifts</a:t>
+            </a:r>
+            <a:endParaRPr lang="en-US" dirty="0" smtClean="0">
+              <a:solidFill>
+                <a:schemeClr val="bg1"/>
+              </a:solidFill>
+            </a:endParaRPr>
+          </a:p>
+          <a:p>
             <a:r>
               <a:rPr lang="en-US" dirty="0" smtClean="0">
                 <a:solidFill>
                   <a:schemeClr val="bg1"/>
                 </a:solidFill>
               </a:rPr>
-              <a:t> </a:t>
-            </a:r>
-          </a:p>
-          <a:p>
+              <a:t>	</a:t>
+            </a:r>
             <a:r>
               <a:rPr lang="en-US" dirty="0" smtClean="0">
                 <a:solidFill>
                   <a:schemeClr val="bg1"/>
                 </a:solidFill>
               </a:rPr>
-              <a:t>	Your Employee Scheduling System</a:t>
+              <a:t>Your peers may be looking to trade shifts with you.</a:t>
             </a:r>
             <a:endParaRPr lang="en-US" dirty="0">
               <a:solidFill>
@@ -4992,25 +5017,22 @@
                   <a:schemeClr val="bg1"/>
                 </a:solidFill>
               </a:rPr>
-              <a:t>Welcome to When2Work </a:t>
-            </a:r>
+              <a:t>Send a Message to a colleague</a:t>
+            </a:r>
+            <a:endParaRPr lang="en-US" dirty="0" smtClean="0">
+              <a:solidFill>
+                <a:schemeClr val="bg1"/>
+              </a:solidFill>
+            </a:endParaRPr>
+          </a:p>
+          <a:p>
             <a:r>
               <a:rPr lang="en-US" dirty="0" smtClean="0">
                 <a:solidFill>
                   <a:schemeClr val="bg1"/>
                 </a:solidFill>
               </a:rPr>
-              <a:t> </a:t>
-            </a:r>
-          </a:p>
-          <a:p>
-            <a:r>
-              <a:rPr lang="en-US" dirty="0" smtClean="0">
-                <a:solidFill>
-                  <a:schemeClr val="bg1"/>
-                </a:solidFill>
-              </a:rPr>
-              <a:t>	Your Employee Scheduling System</a:t>
+              <a:t>	You may send a message to a coworker or manager.</a:t>
             </a:r>
             <a:endParaRPr lang="en-US" dirty="0">
               <a:solidFill>
@@ -5292,25 +5314,30 @@
                   <a:schemeClr val="bg1"/>
                 </a:solidFill>
               </a:rPr>
-              <a:t>Welcome to When2Work </a:t>
-            </a:r>
+              <a:t>Send a message to your manager</a:t>
+            </a:r>
+            <a:endParaRPr lang="en-US" dirty="0" smtClean="0">
+              <a:solidFill>
+                <a:schemeClr val="bg1"/>
+              </a:solidFill>
+            </a:endParaRPr>
+          </a:p>
+          <a:p>
             <a:r>
               <a:rPr lang="en-US" dirty="0" smtClean="0">
                 <a:solidFill>
                   <a:schemeClr val="bg1"/>
                 </a:solidFill>
               </a:rPr>
-              <a:t> </a:t>
-            </a:r>
-          </a:p>
-          <a:p>
+              <a:t>	</a:t>
+            </a:r>
             <a:r>
               <a:rPr lang="en-US" dirty="0" smtClean="0">
                 <a:solidFill>
                   <a:schemeClr val="bg1"/>
                 </a:solidFill>
               </a:rPr>
-              <a:t>	Your Employee Scheduling System</a:t>
+              <a:t>Select who you wish to send it to then add a note.</a:t>
             </a:r>
             <a:endParaRPr lang="en-US" dirty="0">
               <a:solidFill>
@@ -5572,8 +5599,8 @@
         </p:nvSpPr>
         <p:spPr>
           <a:xfrm>
-            <a:off x="2657393" y="5929569"/>
-            <a:ext cx="6232358" cy="738664"/>
+            <a:off x="2673002" y="5842330"/>
+            <a:ext cx="6232358" cy="1015663"/>
           </a:xfrm>
           <a:prstGeom prst="rect">
             <a:avLst/>
@@ -5592,25 +5619,38 @@
                   <a:schemeClr val="bg1"/>
                 </a:solidFill>
               </a:rPr>
-              <a:t>Welcome to When2Work </a:t>
-            </a:r>
+              <a:t>View all staff who shar</a:t>
+            </a:r>
+            <a:r>
+              <a:rPr lang="en-US" sz="2400" b="1" dirty="0" smtClean="0">
+                <a:solidFill>
+                  <a:schemeClr val="bg1"/>
+                </a:solidFill>
+              </a:rPr>
+              <a:t>e your work</a:t>
+            </a:r>
+            <a:endParaRPr lang="en-US" dirty="0" smtClean="0">
+              <a:solidFill>
+                <a:schemeClr val="bg1"/>
+              </a:solidFill>
+            </a:endParaRPr>
+          </a:p>
+          <a:p>
             <a:r>
               <a:rPr lang="en-US" dirty="0" smtClean="0">
                 <a:solidFill>
                   <a:schemeClr val="bg1"/>
                 </a:solidFill>
               </a:rPr>
-              <a:t> </a:t>
-            </a:r>
-          </a:p>
-          <a:p>
+              <a:t>	</a:t>
+            </a:r>
             <a:r>
               <a:rPr lang="en-US" dirty="0" smtClean="0">
                 <a:solidFill>
                   <a:schemeClr val="bg1"/>
                 </a:solidFill>
               </a:rPr>
-              <a:t>	Your Employee Scheduling System</a:t>
+              <a:t>You may send them a message here, too, and see the phone numbers of those who chose to have it public.</a:t>
             </a:r>
             <a:endParaRPr lang="en-US" dirty="0">
               <a:solidFill>
@@ -5892,25 +5932,30 @@
                   <a:schemeClr val="bg1"/>
                 </a:solidFill>
               </a:rPr>
-              <a:t>Welcome to When2Work </a:t>
-            </a:r>
+              <a:t>See who is currently scheduled</a:t>
+            </a:r>
+            <a:endParaRPr lang="en-US" dirty="0" smtClean="0">
+              <a:solidFill>
+                <a:schemeClr val="bg1"/>
+              </a:solidFill>
+            </a:endParaRPr>
+          </a:p>
+          <a:p>
             <a:r>
               <a:rPr lang="en-US" dirty="0" smtClean="0">
                 <a:solidFill>
                   <a:schemeClr val="bg1"/>
                 </a:solidFill>
               </a:rPr>
-              <a:t> </a:t>
-            </a:r>
-          </a:p>
-          <a:p>
-            <a:r>
-              <a:rPr lang="en-US" dirty="0" smtClean="0">
+              <a:t>	</a:t>
+            </a:r>
+            <a:r>
+              <a:rPr lang="en-US" sz="1600" dirty="0" smtClean="0">
                 <a:solidFill>
                   <a:schemeClr val="bg1"/>
                 </a:solidFill>
               </a:rPr>
-              <a:t>	Your Employee Scheduling System</a:t>
+              <a:t>You may see who is scheduled and their time of completion.</a:t>
             </a:r>
             <a:endParaRPr lang="en-US" dirty="0">
               <a:solidFill>
@@ -6192,25 +6237,30 @@
                   <a:schemeClr val="bg1"/>
                 </a:solidFill>
               </a:rPr>
-              <a:t>Welcome to When2Work </a:t>
-            </a:r>
+              <a:t>View messages posted by your supervisor</a:t>
+            </a:r>
+            <a:endParaRPr lang="en-US" dirty="0" smtClean="0">
+              <a:solidFill>
+                <a:schemeClr val="bg1"/>
+              </a:solidFill>
+            </a:endParaRPr>
+          </a:p>
+          <a:p>
             <a:r>
               <a:rPr lang="en-US" dirty="0" smtClean="0">
                 <a:solidFill>
                   <a:schemeClr val="bg1"/>
                 </a:solidFill>
               </a:rPr>
-              <a:t> </a:t>
-            </a:r>
-          </a:p>
-          <a:p>
-            <a:r>
-              <a:rPr lang="en-US" dirty="0" smtClean="0">
+              <a:t>	</a:t>
+            </a:r>
+            <a:r>
+              <a:rPr lang="en-US" sz="1600" dirty="0" smtClean="0">
                 <a:solidFill>
                   <a:schemeClr val="bg1"/>
                 </a:solidFill>
               </a:rPr>
-              <a:t>	Your Employee Scheduling System</a:t>
+              <a:t>These may be quick alerts to inform you of critical information</a:t>
             </a:r>
             <a:endParaRPr lang="en-US" dirty="0">
               <a:solidFill>
@@ -7418,25 +7468,30 @@
                   <a:schemeClr val="bg1"/>
                 </a:solidFill>
               </a:rPr>
-              <a:t>Welcome to When2Work </a:t>
-            </a:r>
+              <a:t>Login using your provided username</a:t>
+            </a:r>
+            <a:endParaRPr lang="en-US" dirty="0" smtClean="0">
+              <a:solidFill>
+                <a:schemeClr val="bg1"/>
+              </a:solidFill>
+            </a:endParaRPr>
+          </a:p>
+          <a:p>
             <a:r>
               <a:rPr lang="en-US" dirty="0" smtClean="0">
                 <a:solidFill>
                   <a:schemeClr val="bg1"/>
                 </a:solidFill>
               </a:rPr>
-              <a:t> </a:t>
-            </a:r>
-          </a:p>
-          <a:p>
+              <a:t>	</a:t>
+            </a:r>
             <a:r>
               <a:rPr lang="en-US" dirty="0" smtClean="0">
                 <a:solidFill>
                   <a:schemeClr val="bg1"/>
                 </a:solidFill>
               </a:rPr>
-              <a:t>	Your Employee Scheduling System</a:t>
+              <a:t>You should have received an email from W2W</a:t>
             </a:r>
             <a:endParaRPr lang="en-US" dirty="0">
               <a:solidFill>
@@ -7713,30 +7768,43 @@
           <a:lstStyle/>
           <a:p>
             <a:r>
+              <a:rPr lang="en-US" sz="2400" b="1" dirty="0">
+                <a:solidFill>
+                  <a:schemeClr val="bg1"/>
+                </a:solidFill>
+              </a:rPr>
+              <a:t>U</a:t>
+            </a:r>
+            <a:r>
               <a:rPr lang="en-US" sz="2400" b="1" dirty="0" smtClean="0">
                 <a:solidFill>
                   <a:schemeClr val="bg1"/>
                 </a:solidFill>
               </a:rPr>
-              <a:t>Welcome to When2Work </a:t>
-            </a:r>
+              <a:t>se your password to login</a:t>
+            </a:r>
+            <a:endParaRPr lang="en-US" dirty="0" smtClean="0">
+              <a:solidFill>
+                <a:schemeClr val="bg1"/>
+              </a:solidFill>
+            </a:endParaRPr>
+          </a:p>
+          <a:p>
             <a:r>
               <a:rPr lang="en-US" dirty="0" smtClean="0">
                 <a:solidFill>
                   <a:schemeClr val="bg1"/>
                 </a:solidFill>
               </a:rPr>
-              <a:t> </a:t>
-            </a:r>
-          </a:p>
-          <a:p>
+              <a:t>	</a:t>
+            </a:r>
             <a:r>
               <a:rPr lang="en-US" dirty="0" smtClean="0">
                 <a:solidFill>
                   <a:schemeClr val="bg1"/>
                 </a:solidFill>
               </a:rPr>
-              <a:t>	Your Employee Scheduling System</a:t>
+              <a:t>You will be asked to change it at a later point in time.</a:t>
             </a:r>
             <a:endParaRPr lang="en-US" dirty="0">
               <a:solidFill>
@@ -7998,8 +8066,8 @@
         </p:nvSpPr>
         <p:spPr>
           <a:xfrm>
-            <a:off x="2657393" y="5929569"/>
-            <a:ext cx="6232358" cy="738664"/>
+            <a:off x="2657394" y="5828888"/>
+            <a:ext cx="6232358" cy="1015663"/>
           </a:xfrm>
           <a:prstGeom prst="rect">
             <a:avLst/>
@@ -8018,25 +8086,30 @@
                   <a:schemeClr val="bg1"/>
                 </a:solidFill>
               </a:rPr>
-              <a:t>Welcome to When2Work </a:t>
-            </a:r>
+              <a:t>Press ‘Return’ or click to sign in</a:t>
+            </a:r>
+            <a:endParaRPr lang="en-US" dirty="0" smtClean="0">
+              <a:solidFill>
+                <a:schemeClr val="bg1"/>
+              </a:solidFill>
+            </a:endParaRPr>
+          </a:p>
+          <a:p>
             <a:r>
               <a:rPr lang="en-US" dirty="0" smtClean="0">
                 <a:solidFill>
                   <a:schemeClr val="bg1"/>
                 </a:solidFill>
               </a:rPr>
-              <a:t> </a:t>
-            </a:r>
-          </a:p>
-          <a:p>
+              <a:t>	</a:t>
+            </a:r>
             <a:r>
               <a:rPr lang="en-US" dirty="0" smtClean="0">
                 <a:solidFill>
                   <a:schemeClr val="bg1"/>
                 </a:solidFill>
               </a:rPr>
-              <a:t>	Your Employee Scheduling System</a:t>
+              <a:t>You may verify you typed the password correctly by clicking the symbol to the right of the password field.</a:t>
             </a:r>
             <a:endParaRPr lang="en-US" dirty="0">
               <a:solidFill>
@@ -8318,25 +8391,30 @@
                   <a:schemeClr val="bg1"/>
                 </a:solidFill>
               </a:rPr>
-              <a:t>Welcome to When2Work </a:t>
-            </a:r>
+              <a:t>When2Work Main Menu</a:t>
+            </a:r>
+            <a:endParaRPr lang="en-US" dirty="0" smtClean="0">
+              <a:solidFill>
+                <a:schemeClr val="bg1"/>
+              </a:solidFill>
+            </a:endParaRPr>
+          </a:p>
+          <a:p>
             <a:r>
               <a:rPr lang="en-US" dirty="0" smtClean="0">
                 <a:solidFill>
                   <a:schemeClr val="bg1"/>
                 </a:solidFill>
               </a:rPr>
-              <a:t> </a:t>
-            </a:r>
-          </a:p>
-          <a:p>
+              <a:t>	</a:t>
+            </a:r>
             <a:r>
               <a:rPr lang="en-US" dirty="0" smtClean="0">
                 <a:solidFill>
                   <a:schemeClr val="bg1"/>
                 </a:solidFill>
               </a:rPr>
-              <a:t>	Your Employee Scheduling System</a:t>
+              <a:t>Select an item from the list to check it out!</a:t>
             </a:r>
             <a:endParaRPr lang="en-US" dirty="0">
               <a:solidFill>

</xml_diff>

<commit_message>
finished the W2W scheduling powerpoint. Still needs to be exported to PDF on Windows machine
</commit_message>
<xml_diff>
--- a/When 2 Work/Introduction to W2W.pptx
+++ b/When 2 Work/Introduction to W2W.pptx
@@ -261,7 +261,7 @@
           <a:p>
             <a:fld id="{B4B40502-F996-416A-ACA3-4D0859D5FF4C}" type="datetimeFigureOut">
               <a:rPr lang="en-US" smtClean="0"/>
-              <a:t>11/2/16</a:t>
+              <a:t>11/30/16</a:t>
             </a:fld>
             <a:endParaRPr lang="en-US"/>
           </a:p>
@@ -431,7 +431,7 @@
           <a:p>
             <a:fld id="{B4B40502-F996-416A-ACA3-4D0859D5FF4C}" type="datetimeFigureOut">
               <a:rPr lang="en-US" smtClean="0"/>
-              <a:t>11/2/16</a:t>
+              <a:t>11/30/16</a:t>
             </a:fld>
             <a:endParaRPr lang="en-US"/>
           </a:p>
@@ -611,7 +611,7 @@
           <a:p>
             <a:fld id="{B4B40502-F996-416A-ACA3-4D0859D5FF4C}" type="datetimeFigureOut">
               <a:rPr lang="en-US" smtClean="0"/>
-              <a:t>11/2/16</a:t>
+              <a:t>11/30/16</a:t>
             </a:fld>
             <a:endParaRPr lang="en-US"/>
           </a:p>
@@ -781,7 +781,7 @@
           <a:p>
             <a:fld id="{B4B40502-F996-416A-ACA3-4D0859D5FF4C}" type="datetimeFigureOut">
               <a:rPr lang="en-US" smtClean="0"/>
-              <a:t>11/2/16</a:t>
+              <a:t>11/30/16</a:t>
             </a:fld>
             <a:endParaRPr lang="en-US"/>
           </a:p>
@@ -1027,7 +1027,7 @@
           <a:p>
             <a:fld id="{B4B40502-F996-416A-ACA3-4D0859D5FF4C}" type="datetimeFigureOut">
               <a:rPr lang="en-US" smtClean="0"/>
-              <a:t>11/2/16</a:t>
+              <a:t>11/30/16</a:t>
             </a:fld>
             <a:endParaRPr lang="en-US"/>
           </a:p>
@@ -1259,7 +1259,7 @@
           <a:p>
             <a:fld id="{B4B40502-F996-416A-ACA3-4D0859D5FF4C}" type="datetimeFigureOut">
               <a:rPr lang="en-US" smtClean="0"/>
-              <a:t>11/2/16</a:t>
+              <a:t>11/30/16</a:t>
             </a:fld>
             <a:endParaRPr lang="en-US"/>
           </a:p>
@@ -1626,7 +1626,7 @@
           <a:p>
             <a:fld id="{B4B40502-F996-416A-ACA3-4D0859D5FF4C}" type="datetimeFigureOut">
               <a:rPr lang="en-US" smtClean="0"/>
-              <a:t>11/2/16</a:t>
+              <a:t>11/30/16</a:t>
             </a:fld>
             <a:endParaRPr lang="en-US"/>
           </a:p>
@@ -1744,7 +1744,7 @@
           <a:p>
             <a:fld id="{B4B40502-F996-416A-ACA3-4D0859D5FF4C}" type="datetimeFigureOut">
               <a:rPr lang="en-US" smtClean="0"/>
-              <a:t>11/2/16</a:t>
+              <a:t>11/30/16</a:t>
             </a:fld>
             <a:endParaRPr lang="en-US"/>
           </a:p>
@@ -1839,7 +1839,7 @@
           <a:p>
             <a:fld id="{B4B40502-F996-416A-ACA3-4D0859D5FF4C}" type="datetimeFigureOut">
               <a:rPr lang="en-US" smtClean="0"/>
-              <a:t>11/2/16</a:t>
+              <a:t>11/30/16</a:t>
             </a:fld>
             <a:endParaRPr lang="en-US"/>
           </a:p>
@@ -2116,7 +2116,7 @@
           <a:p>
             <a:fld id="{B4B40502-F996-416A-ACA3-4D0859D5FF4C}" type="datetimeFigureOut">
               <a:rPr lang="en-US" smtClean="0"/>
-              <a:t>11/2/16</a:t>
+              <a:t>11/30/16</a:t>
             </a:fld>
             <a:endParaRPr lang="en-US"/>
           </a:p>
@@ -2369,7 +2369,7 @@
           <a:p>
             <a:fld id="{B4B40502-F996-416A-ACA3-4D0859D5FF4C}" type="datetimeFigureOut">
               <a:rPr lang="en-US" smtClean="0"/>
-              <a:t>11/2/16</a:t>
+              <a:t>11/30/16</a:t>
             </a:fld>
             <a:endParaRPr lang="en-US"/>
           </a:p>
@@ -2582,7 +2582,7 @@
           <a:p>
             <a:fld id="{B4B40502-F996-416A-ACA3-4D0859D5FF4C}" type="datetimeFigureOut">
               <a:rPr lang="en-US" smtClean="0"/>
-              <a:t>11/2/16</a:t>
+              <a:t>11/30/16</a:t>
             </a:fld>
             <a:endParaRPr lang="en-US"/>
           </a:p>
@@ -3507,15 +3507,7 @@
                   <a:schemeClr val="bg1"/>
                 </a:solidFill>
               </a:rPr>
-              <a:t>	</a:t>
-            </a:r>
-            <a:r>
-              <a:rPr lang="en-US" dirty="0" smtClean="0">
-                <a:solidFill>
-                  <a:schemeClr val="bg1"/>
-                </a:solidFill>
-              </a:rPr>
-              <a:t>Here, you can see who is working for a full week.</a:t>
+              <a:t>	Here, you can see who is working for a full week.</a:t>
             </a:r>
             <a:endParaRPr lang="en-US" dirty="0">
               <a:solidFill>
@@ -4727,15 +4719,7 @@
                   <a:schemeClr val="bg1"/>
                 </a:solidFill>
               </a:rPr>
-              <a:t>	</a:t>
-            </a:r>
-            <a:r>
-              <a:rPr lang="en-US" dirty="0" smtClean="0">
-                <a:solidFill>
-                  <a:schemeClr val="bg1"/>
-                </a:solidFill>
-              </a:rPr>
-              <a:t>Your peers may be looking to trade shifts with you.</a:t>
+              <a:t>	Your peers may be looking to trade shifts with you.</a:t>
             </a:r>
             <a:endParaRPr lang="en-US" dirty="0">
               <a:solidFill>
@@ -5329,15 +5313,7 @@
                   <a:schemeClr val="bg1"/>
                 </a:solidFill>
               </a:rPr>
-              <a:t>	</a:t>
-            </a:r>
-            <a:r>
-              <a:rPr lang="en-US" dirty="0" smtClean="0">
-                <a:solidFill>
-                  <a:schemeClr val="bg1"/>
-                </a:solidFill>
-              </a:rPr>
-              <a:t>Select who you wish to send it to then add a note.</a:t>
+              <a:t>	Select who you wish to send it to then add a note.</a:t>
             </a:r>
             <a:endParaRPr lang="en-US" dirty="0">
               <a:solidFill>
@@ -5600,7 +5576,7 @@
         <p:spPr>
           <a:xfrm>
             <a:off x="2673002" y="5842330"/>
-            <a:ext cx="6232358" cy="1015663"/>
+            <a:ext cx="6232358" cy="892552"/>
           </a:xfrm>
           <a:prstGeom prst="rect">
             <a:avLst/>
@@ -5619,15 +5595,7 @@
                   <a:schemeClr val="bg1"/>
                 </a:solidFill>
               </a:rPr>
-              <a:t>View all staff who shar</a:t>
-            </a:r>
-            <a:r>
-              <a:rPr lang="en-US" sz="2400" b="1" dirty="0" smtClean="0">
-                <a:solidFill>
-                  <a:schemeClr val="bg1"/>
-                </a:solidFill>
-              </a:rPr>
-              <a:t>e your work</a:t>
+              <a:t>View all staff who share your work</a:t>
             </a:r>
             <a:endParaRPr lang="en-US" dirty="0" smtClean="0">
               <a:solidFill>
@@ -5637,22 +5605,14 @@
           </a:p>
           <a:p>
             <a:r>
-              <a:rPr lang="en-US" dirty="0" smtClean="0">
+              <a:rPr lang="en-US" sz="1400" dirty="0" smtClean="0">
                 <a:solidFill>
                   <a:schemeClr val="bg1"/>
                 </a:solidFill>
               </a:rPr>
-              <a:t>	</a:t>
-            </a:r>
-            <a:r>
-              <a:rPr lang="en-US" dirty="0" smtClean="0">
-                <a:solidFill>
-                  <a:schemeClr val="bg1"/>
-                </a:solidFill>
-              </a:rPr>
-              <a:t>You may send them a message here, too, and see the phone numbers of those who chose to have it public.</a:t>
-            </a:r>
-            <a:endParaRPr lang="en-US" dirty="0">
+              <a:t>	You may send them a message here, too, and see the phone numbers of those who chose to have it public.</a:t>
+            </a:r>
+            <a:endParaRPr lang="en-US" sz="1400" dirty="0">
               <a:solidFill>
                 <a:schemeClr val="bg1"/>
               </a:solidFill>
@@ -7483,15 +7443,7 @@
                   <a:schemeClr val="bg1"/>
                 </a:solidFill>
               </a:rPr>
-              <a:t>	</a:t>
-            </a:r>
-            <a:r>
-              <a:rPr lang="en-US" dirty="0" smtClean="0">
-                <a:solidFill>
-                  <a:schemeClr val="bg1"/>
-                </a:solidFill>
-              </a:rPr>
-              <a:t>You should have received an email from W2W</a:t>
+              <a:t>	You should have received an email from W2W</a:t>
             </a:r>
             <a:endParaRPr lang="en-US" dirty="0">
               <a:solidFill>
@@ -7796,15 +7748,7 @@
                   <a:schemeClr val="bg1"/>
                 </a:solidFill>
               </a:rPr>
-              <a:t>	</a:t>
-            </a:r>
-            <a:r>
-              <a:rPr lang="en-US" dirty="0" smtClean="0">
-                <a:solidFill>
-                  <a:schemeClr val="bg1"/>
-                </a:solidFill>
-              </a:rPr>
-              <a:t>You will be asked to change it at a later point in time.</a:t>
+              <a:t>	You will be asked to change it at a later point in time.</a:t>
             </a:r>
             <a:endParaRPr lang="en-US" dirty="0">
               <a:solidFill>
@@ -8101,15 +8045,7 @@
                   <a:schemeClr val="bg1"/>
                 </a:solidFill>
               </a:rPr>
-              <a:t>	</a:t>
-            </a:r>
-            <a:r>
-              <a:rPr lang="en-US" dirty="0" smtClean="0">
-                <a:solidFill>
-                  <a:schemeClr val="bg1"/>
-                </a:solidFill>
-              </a:rPr>
-              <a:t>You may verify you typed the password correctly by clicking the symbol to the right of the password field.</a:t>
+              <a:t>	You may verify you typed the password correctly by clicking the symbol to the right of the password field.</a:t>
             </a:r>
             <a:endParaRPr lang="en-US" dirty="0">
               <a:solidFill>
@@ -8406,15 +8342,7 @@
                   <a:schemeClr val="bg1"/>
                 </a:solidFill>
               </a:rPr>
-              <a:t>	</a:t>
-            </a:r>
-            <a:r>
-              <a:rPr lang="en-US" dirty="0" smtClean="0">
-                <a:solidFill>
-                  <a:schemeClr val="bg1"/>
-                </a:solidFill>
-              </a:rPr>
-              <a:t>Select an item from the list to check it out!</a:t>
+              <a:t>	Select an item from the list to check it out!</a:t>
             </a:r>
             <a:endParaRPr lang="en-US" dirty="0">
               <a:solidFill>

</xml_diff>